<commit_message>
Almost all correction done. Discussion on 6 peaks remains.
</commit_message>
<xml_diff>
--- a/04 - Cr MagOpt/Picture/PLE2030.pptx
+++ b/04 - Cr MagOpt/Picture/PLE2030.pptx
@@ -53,7 +53,7 @@
       </p:grpSpPr>
       <p:sp>
         <p:nvSpPr>
-          <p:cNvPr id="26" name="PlaceHolder 1"/>
+          <p:cNvPr id="23" name="PlaceHolder 1"/>
           <p:cNvSpPr>
             <a:spLocks noGrp="1"/>
           </p:cNvSpPr>
@@ -64,7 +64,7 @@
         <p:spPr>
           <a:xfrm>
             <a:off x="769680" y="3579480"/>
-            <a:ext cx="8722080" cy="2469600"/>
+            <a:ext cx="8721720" cy="2469600"/>
           </a:xfrm>
           <a:prstGeom prst="rect">
             <a:avLst/>
@@ -73,13 +73,14 @@
         <p:txBody>
           <a:bodyPr lIns="0" rIns="0" tIns="0" bIns="0" anchor="ctr"/>
           <a:p>
-            <a:endParaRPr/>
-          </a:p>
-        </p:txBody>
-      </p:sp>
-      <p:sp>
-        <p:nvSpPr>
-          <p:cNvPr id="27" name="PlaceHolder 2"/>
+            <a:pPr algn="ctr"/>
+            <a:endParaRPr/>
+          </a:p>
+        </p:txBody>
+      </p:sp>
+      <p:sp>
+        <p:nvSpPr>
+          <p:cNvPr id="24" name="PlaceHolder 2"/>
           <p:cNvSpPr>
             <a:spLocks noGrp="1"/>
           </p:cNvSpPr>
@@ -105,7 +106,7 @@
       </p:sp>
       <p:sp>
         <p:nvSpPr>
-          <p:cNvPr id="28" name="PlaceHolder 3"/>
+          <p:cNvPr id="25" name="PlaceHolder 3"/>
           <p:cNvSpPr>
             <a:spLocks noGrp="1"/>
           </p:cNvSpPr>
@@ -153,7 +154,7 @@
       </p:grpSpPr>
       <p:sp>
         <p:nvSpPr>
-          <p:cNvPr id="29" name="PlaceHolder 1"/>
+          <p:cNvPr id="26" name="PlaceHolder 1"/>
           <p:cNvSpPr>
             <a:spLocks noGrp="1"/>
           </p:cNvSpPr>
@@ -164,7 +165,7 @@
         <p:spPr>
           <a:xfrm>
             <a:off x="769680" y="3579480"/>
-            <a:ext cx="8722080" cy="2469600"/>
+            <a:ext cx="8721720" cy="2469600"/>
           </a:xfrm>
           <a:prstGeom prst="rect">
             <a:avLst/>
@@ -173,13 +174,14 @@
         <p:txBody>
           <a:bodyPr lIns="0" rIns="0" tIns="0" bIns="0" anchor="ctr"/>
           <a:p>
-            <a:endParaRPr/>
-          </a:p>
-        </p:txBody>
-      </p:sp>
-      <p:sp>
-        <p:nvSpPr>
-          <p:cNvPr id="30" name="PlaceHolder 2"/>
+            <a:pPr algn="ctr"/>
+            <a:endParaRPr/>
+          </a:p>
+        </p:txBody>
+      </p:sp>
+      <p:sp>
+        <p:nvSpPr>
+          <p:cNvPr id="27" name="PlaceHolder 2"/>
           <p:cNvSpPr>
             <a:spLocks noGrp="1"/>
           </p:cNvSpPr>
@@ -205,7 +207,7 @@
       </p:sp>
       <p:sp>
         <p:nvSpPr>
-          <p:cNvPr id="31" name="PlaceHolder 3"/>
+          <p:cNvPr id="28" name="PlaceHolder 3"/>
           <p:cNvSpPr>
             <a:spLocks noGrp="1"/>
           </p:cNvSpPr>
@@ -231,7 +233,7 @@
       </p:sp>
       <p:sp>
         <p:nvSpPr>
-          <p:cNvPr id="32" name="PlaceHolder 4"/>
+          <p:cNvPr id="29" name="PlaceHolder 4"/>
           <p:cNvSpPr>
             <a:spLocks noGrp="1"/>
           </p:cNvSpPr>
@@ -257,7 +259,7 @@
       </p:sp>
       <p:sp>
         <p:nvSpPr>
-          <p:cNvPr id="33" name="PlaceHolder 5"/>
+          <p:cNvPr id="30" name="PlaceHolder 5"/>
           <p:cNvSpPr>
             <a:spLocks noGrp="1"/>
           </p:cNvSpPr>
@@ -305,7 +307,7 @@
       </p:grpSpPr>
       <p:sp>
         <p:nvSpPr>
-          <p:cNvPr id="34" name="PlaceHolder 1"/>
+          <p:cNvPr id="31" name="PlaceHolder 1"/>
           <p:cNvSpPr>
             <a:spLocks noGrp="1"/>
           </p:cNvSpPr>
@@ -316,7 +318,7 @@
         <p:spPr>
           <a:xfrm>
             <a:off x="769680" y="3579480"/>
-            <a:ext cx="8722080" cy="2469600"/>
+            <a:ext cx="8721720" cy="2469600"/>
           </a:xfrm>
           <a:prstGeom prst="rect">
             <a:avLst/>
@@ -325,13 +327,14 @@
         <p:txBody>
           <a:bodyPr lIns="0" rIns="0" tIns="0" bIns="0" anchor="ctr"/>
           <a:p>
-            <a:endParaRPr/>
-          </a:p>
-        </p:txBody>
-      </p:sp>
-      <p:sp>
-        <p:nvSpPr>
-          <p:cNvPr id="35" name="PlaceHolder 2"/>
+            <a:pPr algn="ctr"/>
+            <a:endParaRPr/>
+          </a:p>
+        </p:txBody>
+      </p:sp>
+      <p:sp>
+        <p:nvSpPr>
+          <p:cNvPr id="32" name="PlaceHolder 2"/>
           <p:cNvSpPr>
             <a:spLocks noGrp="1"/>
           </p:cNvSpPr>
@@ -357,7 +360,7 @@
       </p:sp>
       <p:sp>
         <p:nvSpPr>
-          <p:cNvPr id="36" name="PlaceHolder 3"/>
+          <p:cNvPr id="33" name="PlaceHolder 3"/>
           <p:cNvSpPr>
             <a:spLocks noGrp="1"/>
           </p:cNvSpPr>
@@ -383,7 +386,7 @@
       </p:sp>
       <p:pic>
         <p:nvPicPr>
-          <p:cNvPr id="37" name="" descr=""/>
+          <p:cNvPr id="34" name="" descr=""/>
           <p:cNvPicPr/>
           <p:nvPr/>
         </p:nvPicPr>
@@ -408,7 +411,7 @@
       </p:pic>
       <p:pic>
         <p:nvPicPr>
-          <p:cNvPr id="38" name="" descr=""/>
+          <p:cNvPr id="35" name="" descr=""/>
           <p:cNvPicPr/>
           <p:nvPr/>
         </p:nvPicPr>
@@ -455,7 +458,7 @@
       </p:grpSpPr>
       <p:sp>
         <p:nvSpPr>
-          <p:cNvPr id="5" name="PlaceHolder 1"/>
+          <p:cNvPr id="2" name="PlaceHolder 1"/>
           <p:cNvSpPr>
             <a:spLocks noGrp="1"/>
           </p:cNvSpPr>
@@ -466,7 +469,7 @@
         <p:spPr>
           <a:xfrm>
             <a:off x="769680" y="3579480"/>
-            <a:ext cx="8722080" cy="2469600"/>
+            <a:ext cx="8721720" cy="2469600"/>
           </a:xfrm>
           <a:prstGeom prst="rect">
             <a:avLst/>
@@ -475,13 +478,14 @@
         <p:txBody>
           <a:bodyPr lIns="0" rIns="0" tIns="0" bIns="0" anchor="ctr"/>
           <a:p>
-            <a:endParaRPr/>
-          </a:p>
-        </p:txBody>
-      </p:sp>
-      <p:sp>
-        <p:nvSpPr>
-          <p:cNvPr id="6" name="PlaceHolder 2"/>
+            <a:pPr algn="ctr"/>
+            <a:endParaRPr/>
+          </a:p>
+        </p:txBody>
+      </p:sp>
+      <p:sp>
+        <p:nvSpPr>
+          <p:cNvPr id="3" name="PlaceHolder 2"/>
           <p:cNvSpPr>
             <a:spLocks noGrp="1"/>
           </p:cNvSpPr>
@@ -530,7 +534,7 @@
       </p:grpSpPr>
       <p:sp>
         <p:nvSpPr>
-          <p:cNvPr id="7" name="PlaceHolder 1"/>
+          <p:cNvPr id="4" name="PlaceHolder 1"/>
           <p:cNvSpPr>
             <a:spLocks noGrp="1"/>
           </p:cNvSpPr>
@@ -541,7 +545,7 @@
         <p:spPr>
           <a:xfrm>
             <a:off x="769680" y="3579480"/>
-            <a:ext cx="8722080" cy="2469600"/>
+            <a:ext cx="8721720" cy="2469600"/>
           </a:xfrm>
           <a:prstGeom prst="rect">
             <a:avLst/>
@@ -550,13 +554,14 @@
         <p:txBody>
           <a:bodyPr lIns="0" rIns="0" tIns="0" bIns="0" anchor="ctr"/>
           <a:p>
-            <a:endParaRPr/>
-          </a:p>
-        </p:txBody>
-      </p:sp>
-      <p:sp>
-        <p:nvSpPr>
-          <p:cNvPr id="8" name="PlaceHolder 2"/>
+            <a:pPr algn="ctr"/>
+            <a:endParaRPr/>
+          </a:p>
+        </p:txBody>
+      </p:sp>
+      <p:sp>
+        <p:nvSpPr>
+          <p:cNvPr id="5" name="PlaceHolder 2"/>
           <p:cNvSpPr>
             <a:spLocks noGrp="1"/>
           </p:cNvSpPr>
@@ -604,7 +609,7 @@
       </p:grpSpPr>
       <p:sp>
         <p:nvSpPr>
-          <p:cNvPr id="9" name="PlaceHolder 1"/>
+          <p:cNvPr id="6" name="PlaceHolder 1"/>
           <p:cNvSpPr>
             <a:spLocks noGrp="1"/>
           </p:cNvSpPr>
@@ -615,7 +620,7 @@
         <p:spPr>
           <a:xfrm>
             <a:off x="769680" y="3579480"/>
-            <a:ext cx="8722080" cy="2469600"/>
+            <a:ext cx="8721720" cy="2469600"/>
           </a:xfrm>
           <a:prstGeom prst="rect">
             <a:avLst/>
@@ -624,13 +629,14 @@
         <p:txBody>
           <a:bodyPr lIns="0" rIns="0" tIns="0" bIns="0" anchor="ctr"/>
           <a:p>
-            <a:endParaRPr/>
-          </a:p>
-        </p:txBody>
-      </p:sp>
-      <p:sp>
-        <p:nvSpPr>
-          <p:cNvPr id="10" name="PlaceHolder 2"/>
+            <a:pPr algn="ctr"/>
+            <a:endParaRPr/>
+          </a:p>
+        </p:txBody>
+      </p:sp>
+      <p:sp>
+        <p:nvSpPr>
+          <p:cNvPr id="7" name="PlaceHolder 2"/>
           <p:cNvSpPr>
             <a:spLocks noGrp="1"/>
           </p:cNvSpPr>
@@ -656,7 +662,7 @@
       </p:sp>
       <p:sp>
         <p:nvSpPr>
-          <p:cNvPr id="11" name="PlaceHolder 3"/>
+          <p:cNvPr id="8" name="PlaceHolder 3"/>
           <p:cNvSpPr>
             <a:spLocks noGrp="1"/>
           </p:cNvSpPr>
@@ -704,7 +710,7 @@
       </p:grpSpPr>
       <p:sp>
         <p:nvSpPr>
-          <p:cNvPr id="12" name="PlaceHolder 1"/>
+          <p:cNvPr id="9" name="PlaceHolder 1"/>
           <p:cNvSpPr>
             <a:spLocks noGrp="1"/>
           </p:cNvSpPr>
@@ -715,7 +721,7 @@
         <p:spPr>
           <a:xfrm>
             <a:off x="769680" y="3579480"/>
-            <a:ext cx="8722080" cy="2469600"/>
+            <a:ext cx="8721720" cy="2469600"/>
           </a:xfrm>
           <a:prstGeom prst="rect">
             <a:avLst/>
@@ -724,6 +730,7 @@
         <p:txBody>
           <a:bodyPr lIns="0" rIns="0" tIns="0" bIns="0" anchor="ctr"/>
           <a:p>
+            <a:pPr algn="ctr"/>
             <a:endParaRPr/>
           </a:p>
         </p:txBody>
@@ -752,7 +759,7 @@
       </p:grpSpPr>
       <p:sp>
         <p:nvSpPr>
-          <p:cNvPr id="13" name="PlaceHolder 1"/>
+          <p:cNvPr id="10" name="PlaceHolder 1"/>
           <p:cNvSpPr>
             <a:spLocks noGrp="1"/>
           </p:cNvSpPr>
@@ -763,7 +770,7 @@
         <p:spPr>
           <a:xfrm>
             <a:off x="769680" y="3579480"/>
-            <a:ext cx="8722080" cy="11447640"/>
+            <a:ext cx="8721720" cy="11447640"/>
           </a:xfrm>
           <a:prstGeom prst="rect">
             <a:avLst/>
@@ -801,7 +808,7 @@
       </p:grpSpPr>
       <p:sp>
         <p:nvSpPr>
-          <p:cNvPr id="14" name="PlaceHolder 1"/>
+          <p:cNvPr id="11" name="PlaceHolder 1"/>
           <p:cNvSpPr>
             <a:spLocks noGrp="1"/>
           </p:cNvSpPr>
@@ -812,7 +819,7 @@
         <p:spPr>
           <a:xfrm>
             <a:off x="769680" y="3579480"/>
-            <a:ext cx="8722080" cy="2469600"/>
+            <a:ext cx="8721720" cy="2469600"/>
           </a:xfrm>
           <a:prstGeom prst="rect">
             <a:avLst/>
@@ -821,13 +828,14 @@
         <p:txBody>
           <a:bodyPr lIns="0" rIns="0" tIns="0" bIns="0" anchor="ctr"/>
           <a:p>
-            <a:endParaRPr/>
-          </a:p>
-        </p:txBody>
-      </p:sp>
-      <p:sp>
-        <p:nvSpPr>
-          <p:cNvPr id="15" name="PlaceHolder 2"/>
+            <a:pPr algn="ctr"/>
+            <a:endParaRPr/>
+          </a:p>
+        </p:txBody>
+      </p:sp>
+      <p:sp>
+        <p:nvSpPr>
+          <p:cNvPr id="12" name="PlaceHolder 2"/>
           <p:cNvSpPr>
             <a:spLocks noGrp="1"/>
           </p:cNvSpPr>
@@ -853,7 +861,7 @@
       </p:sp>
       <p:sp>
         <p:nvSpPr>
-          <p:cNvPr id="16" name="PlaceHolder 3"/>
+          <p:cNvPr id="13" name="PlaceHolder 3"/>
           <p:cNvSpPr>
             <a:spLocks noGrp="1"/>
           </p:cNvSpPr>
@@ -879,7 +887,7 @@
       </p:sp>
       <p:sp>
         <p:nvSpPr>
-          <p:cNvPr id="17" name="PlaceHolder 4"/>
+          <p:cNvPr id="14" name="PlaceHolder 4"/>
           <p:cNvSpPr>
             <a:spLocks noGrp="1"/>
           </p:cNvSpPr>
@@ -927,7 +935,7 @@
       </p:grpSpPr>
       <p:sp>
         <p:nvSpPr>
-          <p:cNvPr id="18" name="PlaceHolder 1"/>
+          <p:cNvPr id="15" name="PlaceHolder 1"/>
           <p:cNvSpPr>
             <a:spLocks noGrp="1"/>
           </p:cNvSpPr>
@@ -938,7 +946,7 @@
         <p:spPr>
           <a:xfrm>
             <a:off x="769680" y="3579480"/>
-            <a:ext cx="8722080" cy="2469600"/>
+            <a:ext cx="8721720" cy="2469600"/>
           </a:xfrm>
           <a:prstGeom prst="rect">
             <a:avLst/>
@@ -947,13 +955,14 @@
         <p:txBody>
           <a:bodyPr lIns="0" rIns="0" tIns="0" bIns="0" anchor="ctr"/>
           <a:p>
-            <a:endParaRPr/>
-          </a:p>
-        </p:txBody>
-      </p:sp>
-      <p:sp>
-        <p:nvSpPr>
-          <p:cNvPr id="19" name="PlaceHolder 2"/>
+            <a:pPr algn="ctr"/>
+            <a:endParaRPr/>
+          </a:p>
+        </p:txBody>
+      </p:sp>
+      <p:sp>
+        <p:nvSpPr>
+          <p:cNvPr id="16" name="PlaceHolder 2"/>
           <p:cNvSpPr>
             <a:spLocks noGrp="1"/>
           </p:cNvSpPr>
@@ -979,7 +988,7 @@
       </p:sp>
       <p:sp>
         <p:nvSpPr>
-          <p:cNvPr id="20" name="PlaceHolder 3"/>
+          <p:cNvPr id="17" name="PlaceHolder 3"/>
           <p:cNvSpPr>
             <a:spLocks noGrp="1"/>
           </p:cNvSpPr>
@@ -1005,7 +1014,7 @@
       </p:sp>
       <p:sp>
         <p:nvSpPr>
-          <p:cNvPr id="21" name="PlaceHolder 4"/>
+          <p:cNvPr id="18" name="PlaceHolder 4"/>
           <p:cNvSpPr>
             <a:spLocks noGrp="1"/>
           </p:cNvSpPr>
@@ -1053,7 +1062,7 @@
       </p:grpSpPr>
       <p:sp>
         <p:nvSpPr>
-          <p:cNvPr id="22" name="PlaceHolder 1"/>
+          <p:cNvPr id="19" name="PlaceHolder 1"/>
           <p:cNvSpPr>
             <a:spLocks noGrp="1"/>
           </p:cNvSpPr>
@@ -1064,7 +1073,7 @@
         <p:spPr>
           <a:xfrm>
             <a:off x="769680" y="3579480"/>
-            <a:ext cx="8722080" cy="2469600"/>
+            <a:ext cx="8721720" cy="2469600"/>
           </a:xfrm>
           <a:prstGeom prst="rect">
             <a:avLst/>
@@ -1073,13 +1082,14 @@
         <p:txBody>
           <a:bodyPr lIns="0" rIns="0" tIns="0" bIns="0" anchor="ctr"/>
           <a:p>
-            <a:endParaRPr/>
-          </a:p>
-        </p:txBody>
-      </p:sp>
-      <p:sp>
-        <p:nvSpPr>
-          <p:cNvPr id="23" name="PlaceHolder 2"/>
+            <a:pPr algn="ctr"/>
+            <a:endParaRPr/>
+          </a:p>
+        </p:txBody>
+      </p:sp>
+      <p:sp>
+        <p:nvSpPr>
+          <p:cNvPr id="20" name="PlaceHolder 2"/>
           <p:cNvSpPr>
             <a:spLocks noGrp="1"/>
           </p:cNvSpPr>
@@ -1105,7 +1115,7 @@
       </p:sp>
       <p:sp>
         <p:nvSpPr>
-          <p:cNvPr id="24" name="PlaceHolder 3"/>
+          <p:cNvPr id="21" name="PlaceHolder 3"/>
           <p:cNvSpPr>
             <a:spLocks noGrp="1"/>
           </p:cNvSpPr>
@@ -1131,7 +1141,7 @@
       </p:sp>
       <p:sp>
         <p:nvSpPr>
-          <p:cNvPr id="25" name="PlaceHolder 4"/>
+          <p:cNvPr id="22" name="PlaceHolder 4"/>
           <p:cNvSpPr>
             <a:spLocks noGrp="1"/>
           </p:cNvSpPr>
@@ -1197,28 +1207,20 @@
         <p:spPr>
           <a:xfrm>
             <a:off x="769680" y="3579480"/>
-            <a:ext cx="8722080" cy="2469240"/>
-          </a:xfrm>
-          <a:prstGeom prst="rect">
-            <a:avLst/>
-          </a:prstGeom>
-        </p:spPr>
-        <p:txBody>
-          <a:bodyPr lIns="123480" rIns="123480" tIns="61560" bIns="61560" anchor="ctr"/>
-          <a:p>
-            <a:pPr algn="ctr">
-              <a:lnSpc>
-                <a:spcPct val="100000"/>
-              </a:lnSpc>
-            </a:pPr>
+            <a:ext cx="8721720" cy="2469240"/>
+          </a:xfrm>
+          <a:prstGeom prst="rect">
+            <a:avLst/>
+          </a:prstGeom>
+        </p:spPr>
+        <p:txBody>
+          <a:bodyPr lIns="0" rIns="0" tIns="0" bIns="0" anchor="ctr"/>
+          <a:p>
             <a:r>
-              <a:rPr lang="fr-FR" sz="5900">
-                <a:solidFill>
-                  <a:srgbClr val="000000"/>
-                </a:solidFill>
-                <a:latin typeface="Calibri"/>
+              <a:rPr lang="en-US">
+                <a:latin typeface="Arial"/>
               </a:rPr>
-              <a:t>Click to edit the title text formatModifiez le style du titre</a:t>
+              <a:t>Click to edit the title text format</a:t>
             </a:r>
             <a:endParaRPr/>
           </a:p>
@@ -1227,112 +1229,6 @@
       <p:sp>
         <p:nvSpPr>
           <p:cNvPr id="1" name="PlaceHolder 2"/>
-          <p:cNvSpPr>
-            <a:spLocks noGrp="1"/>
-          </p:cNvSpPr>
-          <p:nvPr>
-            <p:ph type="dt"/>
-          </p:nvPr>
-        </p:nvSpPr>
-        <p:spPr>
-          <a:xfrm>
-            <a:off x="513000" y="10679400"/>
-            <a:ext cx="2394000" cy="613080"/>
-          </a:xfrm>
-          <a:prstGeom prst="rect">
-            <a:avLst/>
-          </a:prstGeom>
-        </p:spPr>
-        <p:txBody>
-          <a:bodyPr lIns="123480" rIns="123480" tIns="61560" bIns="61560" anchor="ctr"/>
-          <a:p>
-            <a:pPr>
-              <a:lnSpc>
-                <a:spcPct val="100000"/>
-              </a:lnSpc>
-            </a:pPr>
-            <a:r>
-              <a:rPr lang="en-US" sz="1600">
-                <a:solidFill>
-                  <a:srgbClr val="8b8b8b"/>
-                </a:solidFill>
-                <a:latin typeface="Calibri"/>
-              </a:rPr>
-              <a:t>4/4/17</a:t>
-            </a:r>
-            <a:endParaRPr/>
-          </a:p>
-        </p:txBody>
-      </p:sp>
-      <p:sp>
-        <p:nvSpPr>
-          <p:cNvPr id="2" name="PlaceHolder 3"/>
-          <p:cNvSpPr>
-            <a:spLocks noGrp="1"/>
-          </p:cNvSpPr>
-          <p:nvPr>
-            <p:ph type="ftr"/>
-          </p:nvPr>
-        </p:nvSpPr>
-        <p:spPr>
-          <a:xfrm>
-            <a:off x="3506040" y="10679400"/>
-            <a:ext cx="3249000" cy="613080"/>
-          </a:xfrm>
-          <a:prstGeom prst="rect">
-            <a:avLst/>
-          </a:prstGeom>
-        </p:spPr>
-        <p:txBody>
-          <a:bodyPr lIns="123480" rIns="123480" tIns="61560" bIns="61560" anchor="ctr"/>
-          <a:p>
-            <a:endParaRPr/>
-          </a:p>
-        </p:txBody>
-      </p:sp>
-      <p:sp>
-        <p:nvSpPr>
-          <p:cNvPr id="3" name="PlaceHolder 4"/>
-          <p:cNvSpPr>
-            <a:spLocks noGrp="1"/>
-          </p:cNvSpPr>
-          <p:nvPr>
-            <p:ph type="sldNum"/>
-          </p:nvPr>
-        </p:nvSpPr>
-        <p:spPr>
-          <a:xfrm>
-            <a:off x="7354080" y="10679400"/>
-            <a:ext cx="2394000" cy="613080"/>
-          </a:xfrm>
-          <a:prstGeom prst="rect">
-            <a:avLst/>
-          </a:prstGeom>
-        </p:spPr>
-        <p:txBody>
-          <a:bodyPr lIns="123480" rIns="123480" tIns="61560" bIns="61560" anchor="ctr"/>
-          <a:p>
-            <a:pPr algn="r">
-              <a:lnSpc>
-                <a:spcPct val="100000"/>
-              </a:lnSpc>
-            </a:pPr>
-            <a:fld id="{8E317702-6E5E-4CB0-B9D9-72529D016496}" type="slidenum">
-              <a:rPr lang="en-US" sz="1600">
-                <a:solidFill>
-                  <a:srgbClr val="8b8b8b"/>
-                </a:solidFill>
-                <a:latin typeface="Calibri"/>
-              </a:rPr>
-              <a:t>&lt;number&gt;</a:t>
-            </a:fld>
-            <a:endParaRPr/>
-          </a:p>
-        </p:txBody>
-      </p:sp>
-      <p:sp>
-        <p:nvSpPr>
-          <p:cNvPr id="4" name="PlaceHolder 5"/>
           <p:cNvSpPr>
             <a:spLocks noGrp="1"/>
           </p:cNvSpPr>
@@ -1358,8 +1254,8 @@
               <a:buChar char=""/>
             </a:pPr>
             <a:r>
-              <a:rPr lang="fr-FR" sz="4300">
-                <a:latin typeface="Calibri"/>
+              <a:rPr lang="en-US" sz="3200">
+                <a:latin typeface="Arial"/>
               </a:rPr>
               <a:t>Click to edit the outline text format</a:t>
             </a:r>
@@ -1372,8 +1268,8 @@
               <a:buChar char=""/>
             </a:pPr>
             <a:r>
-              <a:rPr lang="fr-FR" sz="3200">
-                <a:latin typeface="Calibri"/>
+              <a:rPr lang="en-US" sz="2800">
+                <a:latin typeface="Arial"/>
               </a:rPr>
               <a:t>Second Outline Level</a:t>
             </a:r>
@@ -1386,8 +1282,8 @@
               <a:buChar char=""/>
             </a:pPr>
             <a:r>
-              <a:rPr lang="fr-FR" sz="2700">
-                <a:latin typeface="Calibri"/>
+              <a:rPr lang="en-US" sz="2400">
+                <a:latin typeface="Arial"/>
               </a:rPr>
               <a:t>Third Outline Level</a:t>
             </a:r>
@@ -1400,8 +1296,8 @@
               <a:buChar char=""/>
             </a:pPr>
             <a:r>
-              <a:rPr lang="fr-FR" sz="2700">
-                <a:latin typeface="Calibri"/>
+              <a:rPr lang="en-US" sz="2000">
+                <a:latin typeface="Arial"/>
               </a:rPr>
               <a:t>Fourth Outline Level</a:t>
             </a:r>
@@ -1414,8 +1310,8 @@
               <a:buChar char=""/>
             </a:pPr>
             <a:r>
-              <a:rPr lang="fr-FR" sz="2000">
-                <a:latin typeface="Calibri"/>
+              <a:rPr lang="en-US" sz="2000">
+                <a:latin typeface="Arial"/>
               </a:rPr>
               <a:t>Fifth Outline Level</a:t>
             </a:r>
@@ -1428,8 +1324,8 @@
               <a:buChar char=""/>
             </a:pPr>
             <a:r>
-              <a:rPr lang="fr-FR" sz="2000">
-                <a:latin typeface="Calibri"/>
+              <a:rPr lang="en-US" sz="2000">
+                <a:latin typeface="Arial"/>
               </a:rPr>
               <a:t>Sixth Outline Level</a:t>
             </a:r>
@@ -1442,8 +1338,8 @@
               <a:buChar char=""/>
             </a:pPr>
             <a:r>
-              <a:rPr lang="fr-FR" sz="2000">
-                <a:latin typeface="Calibri"/>
+              <a:rPr lang="en-US" sz="2000">
+                <a:latin typeface="Arial"/>
               </a:rPr>
               <a:t>Seventh Outline Level</a:t>
             </a:r>
@@ -1490,7 +1386,7 @@
       </p:grpSpPr>
       <p:pic>
         <p:nvPicPr>
-          <p:cNvPr id="39" name="Picture 10" descr=""/>
+          <p:cNvPr id="36" name="Picture 10" descr=""/>
           <p:cNvPicPr/>
           <p:nvPr/>
         </p:nvPicPr>
@@ -1503,7 +1399,7 @@
         <p:spPr>
           <a:xfrm>
             <a:off x="6088320" y="-71640"/>
-            <a:ext cx="4209840" cy="7199640"/>
+            <a:ext cx="4209480" cy="7199280"/>
           </a:xfrm>
           <a:prstGeom prst="rect">
             <a:avLst/>
@@ -1513,40 +1409,15 @@
           </a:ln>
         </p:spPr>
       </p:pic>
-      <p:sp>
-        <p:nvSpPr>
-          <p:cNvPr id="40" name="CustomShape 1"/>
-          <p:cNvSpPr/>
-          <p:nvPr/>
-        </p:nvSpPr>
-        <p:spPr>
-          <a:xfrm>
-            <a:off x="6957360" y="6699960"/>
-            <a:ext cx="344520" cy="215640"/>
-          </a:xfrm>
-          <a:prstGeom prst="rect">
-            <a:avLst/>
-          </a:prstGeom>
-          <a:solidFill>
-            <a:srgbClr val="ffffff"/>
-          </a:solidFill>
-          <a:ln w="25560">
-            <a:solidFill>
-              <a:srgbClr val="ffffff"/>
-            </a:solidFill>
-            <a:round/>
-          </a:ln>
-        </p:spPr>
-      </p:sp>
       <p:pic>
         <p:nvPicPr>
-          <p:cNvPr id="41" name="Picture 9" descr=""/>
+          <p:cNvPr id="37" name="Picture 9" descr=""/>
           <p:cNvPicPr/>
           <p:nvPr/>
         </p:nvPicPr>
         <p:blipFill>
           <a:blip r:embed="rId2"/>
-          <a:srcRect l="0" t="0" r="6662" b="0"/>
+          <a:srcRect l="0" t="0" r="6653" b="0"/>
           <a:stretch>
             <a:fillRect/>
           </a:stretch>
@@ -1554,7 +1425,7 @@
         <p:spPr>
           <a:xfrm>
             <a:off x="3024000" y="-71640"/>
-            <a:ext cx="3933000" cy="7199640"/>
+            <a:ext cx="3932640" cy="7199280"/>
           </a:xfrm>
           <a:prstGeom prst="rect">
             <a:avLst/>
@@ -1564,34 +1435,9 @@
           </a:ln>
         </p:spPr>
       </p:pic>
-      <p:sp>
-        <p:nvSpPr>
-          <p:cNvPr id="42" name="CustomShape 2"/>
-          <p:cNvSpPr/>
-          <p:nvPr/>
-        </p:nvSpPr>
-        <p:spPr>
-          <a:xfrm>
-            <a:off x="3904560" y="6693480"/>
-            <a:ext cx="344520" cy="215640"/>
-          </a:xfrm>
-          <a:prstGeom prst="rect">
-            <a:avLst/>
-          </a:prstGeom>
-          <a:solidFill>
-            <a:srgbClr val="ffffff"/>
-          </a:solidFill>
-          <a:ln w="25560">
-            <a:solidFill>
-              <a:srgbClr val="ffffff"/>
-            </a:solidFill>
-            <a:round/>
-          </a:ln>
-        </p:spPr>
-      </p:sp>
       <p:pic>
         <p:nvPicPr>
-          <p:cNvPr id="43" name="Picture 6" descr=""/>
+          <p:cNvPr id="38" name="Picture 6" descr=""/>
           <p:cNvPicPr/>
           <p:nvPr/>
         </p:nvPicPr>
@@ -1604,7 +1450,7 @@
         <p:spPr>
           <a:xfrm>
             <a:off x="2520" y="7128720"/>
-            <a:ext cx="10439640" cy="4418280"/>
+            <a:ext cx="10439280" cy="4417920"/>
           </a:xfrm>
           <a:prstGeom prst="rect">
             <a:avLst/>
@@ -1616,13 +1462,13 @@
       </p:pic>
       <p:pic>
         <p:nvPicPr>
-          <p:cNvPr id="44" name="Picture 7" descr=""/>
+          <p:cNvPr id="39" name="Picture 7" descr=""/>
           <p:cNvPicPr/>
           <p:nvPr/>
         </p:nvPicPr>
         <p:blipFill>
           <a:blip r:embed="rId4"/>
-          <a:srcRect l="0" t="0" r="7252" b="0"/>
+          <a:srcRect l="0" t="0" r="7244" b="0"/>
           <a:stretch>
             <a:fillRect/>
           </a:stretch>
@@ -1630,7 +1476,7 @@
         <p:spPr>
           <a:xfrm>
             <a:off x="0" y="-71640"/>
-            <a:ext cx="3904200" cy="7199640"/>
+            <a:ext cx="3903840" cy="7199280"/>
           </a:xfrm>
           <a:prstGeom prst="rect">
             <a:avLst/>
@@ -1642,14 +1488,14 @@
       </p:pic>
       <p:sp>
         <p:nvSpPr>
-          <p:cNvPr id="45" name="CustomShape 3"/>
+          <p:cNvPr id="40" name="CustomShape 1"/>
           <p:cNvSpPr/>
           <p:nvPr/>
         </p:nvSpPr>
         <p:spPr>
           <a:xfrm>
             <a:off x="1097640" y="5634720"/>
-            <a:ext cx="2647800" cy="359640"/>
+            <a:ext cx="2647440" cy="359280"/>
           </a:xfrm>
           <a:prstGeom prst="rect">
             <a:avLst/>
@@ -1665,14 +1511,14 @@
       </p:sp>
       <p:sp>
         <p:nvSpPr>
-          <p:cNvPr id="46" name="CustomShape 4"/>
+          <p:cNvPr id="41" name="CustomShape 2"/>
           <p:cNvSpPr/>
           <p:nvPr/>
         </p:nvSpPr>
         <p:spPr>
           <a:xfrm>
             <a:off x="899640" y="114120"/>
-            <a:ext cx="520920" cy="456120"/>
+            <a:ext cx="520560" cy="455760"/>
           </a:xfrm>
           <a:prstGeom prst="rect">
             <a:avLst/>
@@ -1705,7 +1551,7 @@
       </p:sp>
       <p:sp>
         <p:nvSpPr>
-          <p:cNvPr id="47" name="Line 5"/>
+          <p:cNvPr id="42" name="Line 3"/>
           <p:cNvSpPr/>
           <p:nvPr/>
         </p:nvSpPr>
@@ -1727,7 +1573,32 @@
       </p:sp>
       <p:sp>
         <p:nvSpPr>
-          <p:cNvPr id="48" name="Line 6"/>
+          <p:cNvPr id="43" name="CustomShape 4"/>
+          <p:cNvSpPr/>
+          <p:nvPr/>
+        </p:nvSpPr>
+        <p:spPr>
+          <a:xfrm>
+            <a:off x="6957720" y="6700320"/>
+            <a:ext cx="344160" cy="215280"/>
+          </a:xfrm>
+          <a:prstGeom prst="rect">
+            <a:avLst/>
+          </a:prstGeom>
+          <a:solidFill>
+            <a:srgbClr val="ffffff"/>
+          </a:solidFill>
+          <a:ln w="25560">
+            <a:solidFill>
+              <a:srgbClr val="ffffff"/>
+            </a:solidFill>
+            <a:round/>
+          </a:ln>
+        </p:spPr>
+      </p:sp>
+      <p:sp>
+        <p:nvSpPr>
+          <p:cNvPr id="44" name="Line 5"/>
           <p:cNvSpPr/>
           <p:nvPr/>
         </p:nvSpPr>
@@ -1749,14 +1620,14 @@
       </p:sp>
       <p:sp>
         <p:nvSpPr>
-          <p:cNvPr id="49" name="CustomShape 7"/>
+          <p:cNvPr id="45" name="CustomShape 6"/>
           <p:cNvSpPr/>
           <p:nvPr/>
         </p:nvSpPr>
         <p:spPr>
           <a:xfrm>
             <a:off x="1197720" y="7344720"/>
-            <a:ext cx="537840" cy="456120"/>
+            <a:ext cx="537480" cy="455760"/>
           </a:xfrm>
           <a:prstGeom prst="rect">
             <a:avLst/>
@@ -1789,14 +1660,14 @@
       </p:sp>
       <p:sp>
         <p:nvSpPr>
-          <p:cNvPr id="50" name="CustomShape 8"/>
+          <p:cNvPr id="46" name="CustomShape 7"/>
           <p:cNvSpPr/>
           <p:nvPr/>
         </p:nvSpPr>
         <p:spPr>
           <a:xfrm>
             <a:off x="3940920" y="109800"/>
-            <a:ext cx="537840" cy="456120"/>
+            <a:ext cx="537480" cy="455760"/>
           </a:xfrm>
           <a:prstGeom prst="rect">
             <a:avLst/>
@@ -1829,14 +1700,14 @@
       </p:sp>
       <p:sp>
         <p:nvSpPr>
-          <p:cNvPr id="51" name="CustomShape 9"/>
+          <p:cNvPr id="47" name="CustomShape 8"/>
           <p:cNvSpPr/>
           <p:nvPr/>
         </p:nvSpPr>
         <p:spPr>
           <a:xfrm>
             <a:off x="6985440" y="109800"/>
-            <a:ext cx="520920" cy="456120"/>
+            <a:ext cx="520560" cy="455760"/>
           </a:xfrm>
           <a:prstGeom prst="rect">
             <a:avLst/>
@@ -1866,6 +1737,31 @@
             <a:endParaRPr/>
           </a:p>
         </p:txBody>
+      </p:sp>
+      <p:sp>
+        <p:nvSpPr>
+          <p:cNvPr id="48" name="CustomShape 9"/>
+          <p:cNvSpPr/>
+          <p:nvPr/>
+        </p:nvSpPr>
+        <p:spPr>
+          <a:xfrm>
+            <a:off x="3904920" y="6693840"/>
+            <a:ext cx="344160" cy="215280"/>
+          </a:xfrm>
+          <a:prstGeom prst="rect">
+            <a:avLst/>
+          </a:prstGeom>
+          <a:solidFill>
+            <a:srgbClr val="ffffff"/>
+          </a:solidFill>
+          <a:ln w="25560">
+            <a:solidFill>
+              <a:srgbClr val="ffffff"/>
+            </a:solidFill>
+            <a:round/>
+          </a:ln>
+        </p:spPr>
       </p:sp>
     </p:spTree>
   </p:cSld>

</xml_diff>